<commit_message>
modif du à changment orga
</commit_message>
<xml_diff>
--- a/Cartographie.pptx
+++ b/Cartographie.pptx
@@ -489,7 +489,7 @@
   <pc:docChgLst>
     <pc:chgData name="Alexandre Favre" userId="748b27fbe7958d5e" providerId="LiveId" clId="{834969FF-0F98-49B1-8126-01F38F8F31DC}"/>
     <pc:docChg chg="undo custSel addSld delSld modSld sldOrd">
-      <pc:chgData name="Alexandre Favre" userId="748b27fbe7958d5e" providerId="LiveId" clId="{834969FF-0F98-49B1-8126-01F38F8F31DC}" dt="2024-01-24T14:56:28.258" v="1010" actId="14100"/>
+      <pc:chgData name="Alexandre Favre" userId="748b27fbe7958d5e" providerId="LiveId" clId="{834969FF-0F98-49B1-8126-01F38F8F31DC}" dt="2024-01-24T15:28:52.643" v="1016" actId="20577"/>
       <pc:docMkLst>
         <pc:docMk/>
       </pc:docMkLst>
@@ -840,7 +840,7 @@
         </pc:sldMkLst>
       </pc:sldChg>
       <pc:sldChg chg="addSp delSp modSp add mod">
-        <pc:chgData name="Alexandre Favre" userId="748b27fbe7958d5e" providerId="LiveId" clId="{834969FF-0F98-49B1-8126-01F38F8F31DC}" dt="2024-01-24T14:41:39.917" v="936" actId="1076"/>
+        <pc:chgData name="Alexandre Favre" userId="748b27fbe7958d5e" providerId="LiveId" clId="{834969FF-0F98-49B1-8126-01F38F8F31DC}" dt="2024-01-24T15:28:52.643" v="1016" actId="20577"/>
         <pc:sldMkLst>
           <pc:docMk/>
           <pc:sldMk cId="3318499003" sldId="269"/>
@@ -958,7 +958,7 @@
           </ac:spMkLst>
         </pc:spChg>
         <pc:spChg chg="add mod">
-          <ac:chgData name="Alexandre Favre" userId="748b27fbe7958d5e" providerId="LiveId" clId="{834969FF-0F98-49B1-8126-01F38F8F31DC}" dt="2024-01-24T14:41:39.917" v="936" actId="1076"/>
+          <ac:chgData name="Alexandre Favre" userId="748b27fbe7958d5e" providerId="LiveId" clId="{834969FF-0F98-49B1-8126-01F38F8F31DC}" dt="2024-01-24T15:24:32.223" v="1011" actId="20577"/>
           <ac:spMkLst>
             <pc:docMk/>
             <pc:sldMk cId="3318499003" sldId="269"/>
@@ -966,7 +966,7 @@
           </ac:spMkLst>
         </pc:spChg>
         <pc:spChg chg="add mod">
-          <ac:chgData name="Alexandre Favre" userId="748b27fbe7958d5e" providerId="LiveId" clId="{834969FF-0F98-49B1-8126-01F38F8F31DC}" dt="2024-01-24T14:41:21.212" v="932" actId="1076"/>
+          <ac:chgData name="Alexandre Favre" userId="748b27fbe7958d5e" providerId="LiveId" clId="{834969FF-0F98-49B1-8126-01F38F8F31DC}" dt="2024-01-24T15:28:52.643" v="1016" actId="20577"/>
           <ac:spMkLst>
             <pc:docMk/>
             <pc:sldMk cId="3318499003" sldId="269"/>
@@ -5388,21 +5388,8 @@
                   <a:schemeClr val="tx1"/>
                 </a:solidFill>
               </a:rPr>
-              <a:t>Gestion de la </a:t>
-            </a:r>
-            <a:r>
-              <a:rPr lang="fr-FR" sz="900" dirty="0" err="1">
-                <a:solidFill>
-                  <a:schemeClr val="tx1"/>
-                </a:solidFill>
-              </a:rPr>
-              <a:t>mainteance</a:t>
-            </a:r>
-            <a:endParaRPr lang="fr-FR" sz="900" dirty="0">
-              <a:solidFill>
-                <a:schemeClr val="tx1"/>
-              </a:solidFill>
-            </a:endParaRPr>
+              <a:t>Gestion de la maintenance</a:t>
+            </a:r>
           </a:p>
         </p:txBody>
       </p:sp>
@@ -5457,7 +5444,23 @@
                   <a:schemeClr val="tx1"/>
                 </a:solidFill>
               </a:rPr>
-              <a:t>Maintenir le system d’information</a:t>
+              <a:t>Maintenir le </a:t>
+            </a:r>
+            <a:r>
+              <a:rPr lang="fr-FR" sz="900" dirty="0" err="1">
+                <a:solidFill>
+                  <a:schemeClr val="tx1"/>
+                </a:solidFill>
+              </a:rPr>
+              <a:t>systéme</a:t>
+            </a:r>
+            <a:r>
+              <a:rPr lang="fr-FR" sz="900" dirty="0">
+                <a:solidFill>
+                  <a:schemeClr val="tx1"/>
+                </a:solidFill>
+              </a:rPr>
+              <a:t> d’information</a:t>
             </a:r>
           </a:p>
         </p:txBody>

</xml_diff>